<commit_message>
upgraded the project to Evento
</commit_message>
<xml_diff>
--- a/static/certitemplate.pptx
+++ b/static/certitemplate.pptx
@@ -261,7 +261,7 @@
           <a:p>
             <a:fld id="{B8357B5A-6115-4802-96E7-76723BFB24EF}" type="datetimeFigureOut">
               <a:rPr lang="en-IN" smtClean="0"/>
-              <a:t>11-04-2024</a:t>
+              <a:t>13-04-2025</a:t>
             </a:fld>
             <a:endParaRPr lang="en-IN"/>
           </a:p>
@@ -461,7 +461,7 @@
           <a:p>
             <a:fld id="{B8357B5A-6115-4802-96E7-76723BFB24EF}" type="datetimeFigureOut">
               <a:rPr lang="en-IN" smtClean="0"/>
-              <a:t>11-04-2024</a:t>
+              <a:t>13-04-2025</a:t>
             </a:fld>
             <a:endParaRPr lang="en-IN"/>
           </a:p>
@@ -671,7 +671,7 @@
           <a:p>
             <a:fld id="{B8357B5A-6115-4802-96E7-76723BFB24EF}" type="datetimeFigureOut">
               <a:rPr lang="en-IN" smtClean="0"/>
-              <a:t>11-04-2024</a:t>
+              <a:t>13-04-2025</a:t>
             </a:fld>
             <a:endParaRPr lang="en-IN"/>
           </a:p>
@@ -871,7 +871,7 @@
           <a:p>
             <a:fld id="{B8357B5A-6115-4802-96E7-76723BFB24EF}" type="datetimeFigureOut">
               <a:rPr lang="en-IN" smtClean="0"/>
-              <a:t>11-04-2024</a:t>
+              <a:t>13-04-2025</a:t>
             </a:fld>
             <a:endParaRPr lang="en-IN"/>
           </a:p>
@@ -1147,7 +1147,7 @@
           <a:p>
             <a:fld id="{B8357B5A-6115-4802-96E7-76723BFB24EF}" type="datetimeFigureOut">
               <a:rPr lang="en-IN" smtClean="0"/>
-              <a:t>11-04-2024</a:t>
+              <a:t>13-04-2025</a:t>
             </a:fld>
             <a:endParaRPr lang="en-IN"/>
           </a:p>
@@ -1415,7 +1415,7 @@
           <a:p>
             <a:fld id="{B8357B5A-6115-4802-96E7-76723BFB24EF}" type="datetimeFigureOut">
               <a:rPr lang="en-IN" smtClean="0"/>
-              <a:t>11-04-2024</a:t>
+              <a:t>13-04-2025</a:t>
             </a:fld>
             <a:endParaRPr lang="en-IN"/>
           </a:p>
@@ -1830,7 +1830,7 @@
           <a:p>
             <a:fld id="{B8357B5A-6115-4802-96E7-76723BFB24EF}" type="datetimeFigureOut">
               <a:rPr lang="en-IN" smtClean="0"/>
-              <a:t>11-04-2024</a:t>
+              <a:t>13-04-2025</a:t>
             </a:fld>
             <a:endParaRPr lang="en-IN"/>
           </a:p>
@@ -1972,7 +1972,7 @@
           <a:p>
             <a:fld id="{B8357B5A-6115-4802-96E7-76723BFB24EF}" type="datetimeFigureOut">
               <a:rPr lang="en-IN" smtClean="0"/>
-              <a:t>11-04-2024</a:t>
+              <a:t>13-04-2025</a:t>
             </a:fld>
             <a:endParaRPr lang="en-IN"/>
           </a:p>
@@ -2085,7 +2085,7 @@
           <a:p>
             <a:fld id="{B8357B5A-6115-4802-96E7-76723BFB24EF}" type="datetimeFigureOut">
               <a:rPr lang="en-IN" smtClean="0"/>
-              <a:t>11-04-2024</a:t>
+              <a:t>13-04-2025</a:t>
             </a:fld>
             <a:endParaRPr lang="en-IN"/>
           </a:p>
@@ -2398,7 +2398,7 @@
           <a:p>
             <a:fld id="{B8357B5A-6115-4802-96E7-76723BFB24EF}" type="datetimeFigureOut">
               <a:rPr lang="en-IN" smtClean="0"/>
-              <a:t>11-04-2024</a:t>
+              <a:t>13-04-2025</a:t>
             </a:fld>
             <a:endParaRPr lang="en-IN"/>
           </a:p>
@@ -2687,7 +2687,7 @@
           <a:p>
             <a:fld id="{B8357B5A-6115-4802-96E7-76723BFB24EF}" type="datetimeFigureOut">
               <a:rPr lang="en-IN" smtClean="0"/>
-              <a:t>11-04-2024</a:t>
+              <a:t>13-04-2025</a:t>
             </a:fld>
             <a:endParaRPr lang="en-IN"/>
           </a:p>
@@ -2930,7 +2930,7 @@
           <a:p>
             <a:fld id="{B8357B5A-6115-4802-96E7-76723BFB24EF}" type="datetimeFigureOut">
               <a:rPr lang="en-IN" smtClean="0"/>
-              <a:t>11-04-2024</a:t>
+              <a:t>13-04-2025</a:t>
             </a:fld>
             <a:endParaRPr lang="en-IN"/>
           </a:p>

</xml_diff>